<commit_message>
new syn data set
</commit_message>
<xml_diff>
--- a/data-raw/DirectoryStructureCoordinateTestCatalogs.pptx
+++ b/data-raw/DirectoryStructureCoordinateTestCatalogs.pptx
@@ -243,7 +243,7 @@
           <a:p>
             <a:fld id="{56F6A349-4F42-4F7C-857D-6BFF6B6F337C}" type="datetimeFigureOut">
               <a:rPr lang="en-US" smtClean="0"/>
-              <a:t>2/20/2019</a:t>
+              <a:t>2/23/2019</a:t>
             </a:fld>
             <a:endParaRPr lang="en-US"/>
           </a:p>
@@ -413,7 +413,7 @@
           <a:p>
             <a:fld id="{56F6A349-4F42-4F7C-857D-6BFF6B6F337C}" type="datetimeFigureOut">
               <a:rPr lang="en-US" smtClean="0"/>
-              <a:t>2/20/2019</a:t>
+              <a:t>2/23/2019</a:t>
             </a:fld>
             <a:endParaRPr lang="en-US"/>
           </a:p>
@@ -593,7 +593,7 @@
           <a:p>
             <a:fld id="{56F6A349-4F42-4F7C-857D-6BFF6B6F337C}" type="datetimeFigureOut">
               <a:rPr lang="en-US" smtClean="0"/>
-              <a:t>2/20/2019</a:t>
+              <a:t>2/23/2019</a:t>
             </a:fld>
             <a:endParaRPr lang="en-US"/>
           </a:p>
@@ -763,7 +763,7 @@
           <a:p>
             <a:fld id="{56F6A349-4F42-4F7C-857D-6BFF6B6F337C}" type="datetimeFigureOut">
               <a:rPr lang="en-US" smtClean="0"/>
-              <a:t>2/20/2019</a:t>
+              <a:t>2/23/2019</a:t>
             </a:fld>
             <a:endParaRPr lang="en-US"/>
           </a:p>
@@ -1007,7 +1007,7 @@
           <a:p>
             <a:fld id="{56F6A349-4F42-4F7C-857D-6BFF6B6F337C}" type="datetimeFigureOut">
               <a:rPr lang="en-US" smtClean="0"/>
-              <a:t>2/20/2019</a:t>
+              <a:t>2/23/2019</a:t>
             </a:fld>
             <a:endParaRPr lang="en-US"/>
           </a:p>
@@ -1239,7 +1239,7 @@
           <a:p>
             <a:fld id="{56F6A349-4F42-4F7C-857D-6BFF6B6F337C}" type="datetimeFigureOut">
               <a:rPr lang="en-US" smtClean="0"/>
-              <a:t>2/20/2019</a:t>
+              <a:t>2/23/2019</a:t>
             </a:fld>
             <a:endParaRPr lang="en-US"/>
           </a:p>
@@ -1606,7 +1606,7 @@
           <a:p>
             <a:fld id="{56F6A349-4F42-4F7C-857D-6BFF6B6F337C}" type="datetimeFigureOut">
               <a:rPr lang="en-US" smtClean="0"/>
-              <a:t>2/20/2019</a:t>
+              <a:t>2/23/2019</a:t>
             </a:fld>
             <a:endParaRPr lang="en-US"/>
           </a:p>
@@ -1724,7 +1724,7 @@
           <a:p>
             <a:fld id="{56F6A349-4F42-4F7C-857D-6BFF6B6F337C}" type="datetimeFigureOut">
               <a:rPr lang="en-US" smtClean="0"/>
-              <a:t>2/20/2019</a:t>
+              <a:t>2/23/2019</a:t>
             </a:fld>
             <a:endParaRPr lang="en-US"/>
           </a:p>
@@ -1819,7 +1819,7 @@
           <a:p>
             <a:fld id="{56F6A349-4F42-4F7C-857D-6BFF6B6F337C}" type="datetimeFigureOut">
               <a:rPr lang="en-US" smtClean="0"/>
-              <a:t>2/20/2019</a:t>
+              <a:t>2/23/2019</a:t>
             </a:fld>
             <a:endParaRPr lang="en-US"/>
           </a:p>
@@ -2096,7 +2096,7 @@
           <a:p>
             <a:fld id="{56F6A349-4F42-4F7C-857D-6BFF6B6F337C}" type="datetimeFigureOut">
               <a:rPr lang="en-US" smtClean="0"/>
-              <a:t>2/20/2019</a:t>
+              <a:t>2/23/2019</a:t>
             </a:fld>
             <a:endParaRPr lang="en-US"/>
           </a:p>
@@ -2353,7 +2353,7 @@
           <a:p>
             <a:fld id="{56F6A349-4F42-4F7C-857D-6BFF6B6F337C}" type="datetimeFigureOut">
               <a:rPr lang="en-US" smtClean="0"/>
-              <a:t>2/20/2019</a:t>
+              <a:t>2/23/2019</a:t>
             </a:fld>
             <a:endParaRPr lang="en-US"/>
           </a:p>
@@ -2566,7 +2566,7 @@
           <a:p>
             <a:fld id="{56F6A349-4F42-4F7C-857D-6BFF6B6F337C}" type="datetimeFigureOut">
               <a:rPr lang="en-US" smtClean="0"/>
-              <a:t>2/20/2019</a:t>
+              <a:t>2/23/2019</a:t>
             </a:fld>
             <a:endParaRPr lang="en-US"/>
           </a:p>
@@ -3126,7 +3126,7 @@
         </p:nvSpPr>
         <p:spPr>
           <a:xfrm>
-            <a:off x="1700308" y="974612"/>
+            <a:off x="1423126" y="974612"/>
             <a:ext cx="1344214" cy="276999"/>
           </a:xfrm>
           <a:prstGeom prst="rect">
@@ -3160,8 +3160,8 @@
         </p:nvSpPr>
         <p:spPr>
           <a:xfrm>
-            <a:off x="3084759" y="974613"/>
-            <a:ext cx="782587" cy="276999"/>
+            <a:off x="3427372" y="1003288"/>
+            <a:ext cx="747320" cy="646331"/>
           </a:xfrm>
           <a:prstGeom prst="rect">
             <a:avLst/>
@@ -3176,13 +3176,29 @@
           <a:p>
             <a:pPr algn="ctr"/>
             <a:r>
-              <a:rPr lang="en-US" sz="1200" dirty="0">
+              <a:rPr lang="en-US" sz="1200" dirty="0" smtClean="0">
                 <a:solidFill>
                   <a:srgbClr val="0070C0"/>
                 </a:solidFill>
               </a:rPr>
-              <a:t>sa.sa.96 /</a:t>
-            </a:r>
+              <a:t>sa.sa.96/</a:t>
+            </a:r>
+          </a:p>
+          <a:p>
+            <a:pPr algn="ctr"/>
+            <a:endParaRPr lang="en-US" sz="1200" dirty="0">
+              <a:solidFill>
+                <a:srgbClr val="0070C0"/>
+              </a:solidFill>
+            </a:endParaRPr>
+          </a:p>
+          <a:p>
+            <a:pPr algn="ctr"/>
+            <a:r>
+              <a:rPr lang="en-US" sz="1050" dirty="0" smtClean="0"/>
+              <a:t>(same)</a:t>
+            </a:r>
+            <a:endParaRPr lang="en-US" sz="1050" dirty="0"/>
           </a:p>
         </p:txBody>
       </p:sp>
@@ -3194,7 +3210,7 @@
         </p:nvSpPr>
         <p:spPr>
           <a:xfrm>
-            <a:off x="3877630" y="974613"/>
+            <a:off x="4132515" y="987357"/>
             <a:ext cx="1350626" cy="646331"/>
           </a:xfrm>
           <a:prstGeom prst="rect">
@@ -3225,203 +3241,8 @@
           <a:p>
             <a:pPr algn="ctr"/>
             <a:r>
-              <a:rPr lang="en-US" sz="1200" dirty="0"/>
+              <a:rPr lang="en-US" sz="1050" dirty="0"/>
               <a:t>(same)</a:t>
-            </a:r>
-          </a:p>
-        </p:txBody>
-      </p:sp>
-      <p:sp>
-        <p:nvSpPr>
-          <p:cNvPr id="12" name="TextBox 11"/>
-          <p:cNvSpPr txBox="1"/>
-          <p:nvPr/>
-        </p:nvSpPr>
-        <p:spPr>
-          <a:xfrm>
-            <a:off x="5020114" y="1231573"/>
-            <a:ext cx="1142429" cy="1754326"/>
-          </a:xfrm>
-          <a:prstGeom prst="rect">
-            <a:avLst/>
-          </a:prstGeom>
-          <a:solidFill>
-            <a:schemeClr val="accent6">
-              <a:lumMod val="20000"/>
-              <a:lumOff val="80000"/>
-            </a:schemeClr>
-          </a:solidFill>
-        </p:spPr>
-        <p:txBody>
-          <a:bodyPr wrap="none" rtlCol="0">
-            <a:spAutoFit/>
-          </a:bodyPr>
-          <a:lstStyle/>
-          <a:p>
-            <a:r>
-              <a:rPr lang="en-US" sz="1200" dirty="0">
-                <a:solidFill>
-                  <a:srgbClr val="0070C0"/>
-                </a:solidFill>
-              </a:rPr>
-              <a:t>input.sigs.csv</a:t>
-            </a:r>
-          </a:p>
-          <a:p>
-            <a:r>
-              <a:rPr lang="en-US" sz="1200" dirty="0">
-                <a:solidFill>
-                  <a:srgbClr val="0070C0"/>
-                </a:solidFill>
-              </a:rPr>
-              <a:t>syn.data.csv</a:t>
-            </a:r>
-          </a:p>
-          <a:p>
-            <a:r>
-              <a:rPr lang="en-US" sz="1200" dirty="0" err="1">
-                <a:solidFill>
-                  <a:srgbClr val="C00000"/>
-                </a:solidFill>
-              </a:rPr>
-              <a:t>sa.results</a:t>
-            </a:r>
-            <a:r>
-              <a:rPr lang="en-US" sz="1200" dirty="0">
-                <a:solidFill>
-                  <a:srgbClr val="C00000"/>
-                </a:solidFill>
-              </a:rPr>
-              <a:t>/</a:t>
-            </a:r>
-          </a:p>
-          <a:p>
-            <a:r>
-              <a:rPr lang="en-US" sz="1200" dirty="0">
-                <a:solidFill>
-                  <a:srgbClr val="C00000"/>
-                </a:solidFill>
-              </a:rPr>
-              <a:t>    </a:t>
-            </a:r>
-            <a:r>
-              <a:rPr lang="en-US" sz="1200" dirty="0" err="1">
-                <a:solidFill>
-                  <a:srgbClr val="C00000"/>
-                </a:solidFill>
-              </a:rPr>
-              <a:t>sa.best.run</a:t>
-            </a:r>
-            <a:r>
-              <a:rPr lang="en-US" sz="1200" dirty="0">
-                <a:solidFill>
-                  <a:srgbClr val="C00000"/>
-                </a:solidFill>
-              </a:rPr>
-              <a:t>/</a:t>
-            </a:r>
-          </a:p>
-          <a:p>
-            <a:r>
-              <a:rPr lang="en-US" sz="1200" dirty="0">
-                <a:solidFill>
-                  <a:srgbClr val="C00000"/>
-                </a:solidFill>
-              </a:rPr>
-              <a:t>    </a:t>
-            </a:r>
-            <a:r>
-              <a:rPr lang="en-US" sz="1200" dirty="0" err="1">
-                <a:solidFill>
-                  <a:srgbClr val="C00000"/>
-                </a:solidFill>
-              </a:rPr>
-              <a:t>sa.summary</a:t>
-            </a:r>
-            <a:r>
-              <a:rPr lang="en-US" sz="1200" dirty="0">
-                <a:solidFill>
-                  <a:srgbClr val="C00000"/>
-                </a:solidFill>
-              </a:rPr>
-              <a:t>/</a:t>
-            </a:r>
-          </a:p>
-          <a:p>
-            <a:r>
-              <a:rPr lang="en-US" sz="1200" dirty="0">
-                <a:solidFill>
-                  <a:srgbClr val="C00000"/>
-                </a:solidFill>
-              </a:rPr>
-              <a:t>    </a:t>
-            </a:r>
-            <a:r>
-              <a:rPr lang="en-US" sz="1200" dirty="0" err="1">
-                <a:solidFill>
-                  <a:srgbClr val="C00000"/>
-                </a:solidFill>
-              </a:rPr>
-              <a:t>sa.run.1</a:t>
-            </a:r>
-            <a:r>
-              <a:rPr lang="en-US" sz="1200" dirty="0">
-                <a:solidFill>
-                  <a:srgbClr val="C00000"/>
-                </a:solidFill>
-              </a:rPr>
-              <a:t>/</a:t>
-            </a:r>
-          </a:p>
-          <a:p>
-            <a:r>
-              <a:rPr lang="en-US" sz="1200" dirty="0">
-                <a:solidFill>
-                  <a:srgbClr val="C00000"/>
-                </a:solidFill>
-              </a:rPr>
-              <a:t>    </a:t>
-            </a:r>
-            <a:r>
-              <a:rPr lang="en-US" sz="1200" dirty="0" err="1">
-                <a:solidFill>
-                  <a:srgbClr val="C00000"/>
-                </a:solidFill>
-              </a:rPr>
-              <a:t>sa.run.2</a:t>
-            </a:r>
-            <a:r>
-              <a:rPr lang="en-US" sz="1200" dirty="0">
-                <a:solidFill>
-                  <a:srgbClr val="C00000"/>
-                </a:solidFill>
-              </a:rPr>
-              <a:t>/</a:t>
-            </a:r>
-          </a:p>
-          <a:p>
-            <a:endParaRPr lang="en-US" sz="1200" dirty="0">
-              <a:solidFill>
-                <a:srgbClr val="C00000"/>
-              </a:solidFill>
-            </a:endParaRPr>
-          </a:p>
-          <a:p>
-            <a:r>
-              <a:rPr lang="en-US" sz="1200" dirty="0" err="1">
-                <a:solidFill>
-                  <a:srgbClr val="C00000"/>
-                </a:solidFill>
-              </a:rPr>
-              <a:t>sp.results</a:t>
-            </a:r>
-            <a:r>
-              <a:rPr lang="en-US" sz="1200" dirty="0">
-                <a:solidFill>
-                  <a:srgbClr val="C00000"/>
-                </a:solidFill>
-              </a:rPr>
-              <a:t>/</a:t>
             </a:r>
           </a:p>
         </p:txBody>
@@ -3434,8 +3255,8 @@
         </p:nvSpPr>
         <p:spPr>
           <a:xfrm>
-            <a:off x="1783111" y="1231573"/>
-            <a:ext cx="1142429" cy="1938992"/>
+            <a:off x="1505929" y="1231573"/>
+            <a:ext cx="1930337" cy="2031325"/>
           </a:xfrm>
           <a:prstGeom prst="rect">
             <a:avLst/>
@@ -3449,27 +3270,49 @@
           <a:lstStyle/>
           <a:p>
             <a:r>
-              <a:rPr lang="en-US" sz="1200" dirty="0">
+              <a:rPr lang="en-US" sz="1050" dirty="0" smtClean="0">
                 <a:solidFill>
                   <a:srgbClr val="0070C0"/>
                 </a:solidFill>
               </a:rPr>
-              <a:t>input.sigs.csv</a:t>
-            </a:r>
-          </a:p>
-          <a:p>
-            <a:r>
-              <a:rPr lang="en-US" sz="1200" dirty="0">
+              <a:t>ground.truth.syn.catalog.csv</a:t>
+            </a:r>
+          </a:p>
+          <a:p>
+            <a:r>
+              <a:rPr lang="en-US" sz="1050" dirty="0" smtClean="0">
                 <a:solidFill>
                   <a:srgbClr val="0070C0"/>
                 </a:solidFill>
               </a:rPr>
-              <a:t>syn.data.csv</a:t>
-            </a:r>
-          </a:p>
-          <a:p>
-            <a:r>
-              <a:rPr lang="en-US" sz="1200" dirty="0" err="1">
+              <a:t>ground.truth.syn.exposures.csv</a:t>
+            </a:r>
+          </a:p>
+          <a:p>
+            <a:r>
+              <a:rPr lang="en-US" sz="1050" dirty="0" smtClean="0">
+                <a:solidFill>
+                  <a:srgbClr val="0070C0"/>
+                </a:solidFill>
+              </a:rPr>
+              <a:t>ground.truth.syn.signatures.csv</a:t>
+            </a:r>
+            <a:endParaRPr lang="en-US" sz="1050" dirty="0">
+              <a:solidFill>
+                <a:srgbClr val="0070C0"/>
+              </a:solidFill>
+            </a:endParaRPr>
+          </a:p>
+          <a:p>
+            <a:endParaRPr lang="en-US" sz="1050" dirty="0">
+              <a:solidFill>
+                <a:srgbClr val="0070C0"/>
+              </a:solidFill>
+            </a:endParaRPr>
+          </a:p>
+          <a:p>
+            <a:r>
+              <a:rPr lang="en-US" sz="1050" dirty="0" err="1">
                 <a:solidFill>
                   <a:srgbClr val="C00000"/>
                 </a:solidFill>
@@ -3477,7 +3320,7 @@
               <a:t>sa.results</a:t>
             </a:r>
             <a:r>
-              <a:rPr lang="en-US" sz="1200" dirty="0">
+              <a:rPr lang="en-US" sz="1050" dirty="0">
                 <a:solidFill>
                   <a:srgbClr val="C00000"/>
                 </a:solidFill>
@@ -3487,7 +3330,7 @@
           </a:p>
           <a:p>
             <a:r>
-              <a:rPr lang="en-US" sz="1200" dirty="0">
+              <a:rPr lang="en-US" sz="1050" dirty="0">
                 <a:solidFill>
                   <a:srgbClr val="C00000"/>
                 </a:solidFill>
@@ -3495,7 +3338,7 @@
               <a:t>    </a:t>
             </a:r>
             <a:r>
-              <a:rPr lang="en-US" sz="1200" dirty="0" err="1">
+              <a:rPr lang="en-US" sz="1050" dirty="0" err="1">
                 <a:solidFill>
                   <a:srgbClr val="C00000"/>
                 </a:solidFill>
@@ -3503,7 +3346,7 @@
               <a:t>sa.best.run</a:t>
             </a:r>
             <a:r>
-              <a:rPr lang="en-US" sz="1200" dirty="0">
+              <a:rPr lang="en-US" sz="1050" dirty="0">
                 <a:solidFill>
                   <a:srgbClr val="C00000"/>
                 </a:solidFill>
@@ -3513,7 +3356,7 @@
           </a:p>
           <a:p>
             <a:r>
-              <a:rPr lang="en-US" sz="1200" dirty="0">
+              <a:rPr lang="en-US" sz="1050" dirty="0">
                 <a:solidFill>
                   <a:srgbClr val="C00000"/>
                 </a:solidFill>
@@ -3521,7 +3364,7 @@
               <a:t>    </a:t>
             </a:r>
             <a:r>
-              <a:rPr lang="en-US" sz="1200" dirty="0" err="1">
+              <a:rPr lang="en-US" sz="1050" dirty="0" err="1">
                 <a:solidFill>
                   <a:srgbClr val="C00000"/>
                 </a:solidFill>
@@ -3529,7 +3372,7 @@
               <a:t>sa.summary</a:t>
             </a:r>
             <a:r>
-              <a:rPr lang="en-US" sz="1200" dirty="0">
+              <a:rPr lang="en-US" sz="1050" dirty="0">
                 <a:solidFill>
                   <a:srgbClr val="C00000"/>
                 </a:solidFill>
@@ -3539,7 +3382,7 @@
           </a:p>
           <a:p>
             <a:r>
-              <a:rPr lang="en-US" sz="1200" dirty="0">
+              <a:rPr lang="en-US" sz="1050" dirty="0">
                 <a:solidFill>
                   <a:srgbClr val="C00000"/>
                 </a:solidFill>
@@ -3547,7 +3390,7 @@
               <a:t>    </a:t>
             </a:r>
             <a:r>
-              <a:rPr lang="en-US" sz="1200" dirty="0" err="1">
+              <a:rPr lang="en-US" sz="1050" dirty="0" err="1">
                 <a:solidFill>
                   <a:srgbClr val="C00000"/>
                 </a:solidFill>
@@ -3555,7 +3398,7 @@
               <a:t>sa.run.1</a:t>
             </a:r>
             <a:r>
-              <a:rPr lang="en-US" sz="1200" dirty="0">
+              <a:rPr lang="en-US" sz="1050" dirty="0">
                 <a:solidFill>
                   <a:srgbClr val="C00000"/>
                 </a:solidFill>
@@ -3565,7 +3408,7 @@
           </a:p>
           <a:p>
             <a:r>
-              <a:rPr lang="en-US" sz="1200" dirty="0">
+              <a:rPr lang="en-US" sz="1050" dirty="0">
                 <a:solidFill>
                   <a:srgbClr val="C00000"/>
                 </a:solidFill>
@@ -3573,7 +3416,7 @@
               <a:t>    </a:t>
             </a:r>
             <a:r>
-              <a:rPr lang="en-US" sz="1200" dirty="0" err="1">
+              <a:rPr lang="en-US" sz="1050" dirty="0" err="1">
                 <a:solidFill>
                   <a:srgbClr val="C00000"/>
                 </a:solidFill>
@@ -3581,7 +3424,7 @@
               <a:t>sa.run.2</a:t>
             </a:r>
             <a:r>
-              <a:rPr lang="en-US" sz="1200" dirty="0">
+              <a:rPr lang="en-US" sz="1050" dirty="0">
                 <a:solidFill>
                   <a:srgbClr val="C00000"/>
                 </a:solidFill>
@@ -3590,7 +3433,7 @@
             </a:r>
           </a:p>
           <a:p>
-            <a:endParaRPr lang="en-US" sz="1200" dirty="0">
+            <a:endParaRPr lang="en-US" sz="1050" dirty="0">
               <a:solidFill>
                 <a:srgbClr val="C00000"/>
               </a:solidFill>
@@ -3598,7 +3441,7 @@
           </a:p>
           <a:p>
             <a:r>
-              <a:rPr lang="en-US" sz="1200" dirty="0" err="1">
+              <a:rPr lang="en-US" sz="1050" dirty="0" err="1">
                 <a:solidFill>
                   <a:srgbClr val="C00000"/>
                 </a:solidFill>
@@ -3606,7 +3449,7 @@
               <a:t>sp.results</a:t>
             </a:r>
             <a:r>
-              <a:rPr lang="en-US" sz="1200" dirty="0">
+              <a:rPr lang="en-US" sz="1050" dirty="0">
                 <a:solidFill>
                   <a:srgbClr val="C00000"/>
                 </a:solidFill>
@@ -3616,207 +3459,7 @@
           </a:p>
           <a:p>
             <a:r>
-              <a:rPr lang="en-US" sz="1200" dirty="0">
-                <a:solidFill>
-                  <a:srgbClr val="C00000"/>
-                </a:solidFill>
-              </a:rPr>
-              <a:t>    ….</a:t>
-            </a:r>
-          </a:p>
-        </p:txBody>
-      </p:sp>
-      <p:sp>
-        <p:nvSpPr>
-          <p:cNvPr id="14" name="TextBox 13"/>
-          <p:cNvSpPr txBox="1"/>
-          <p:nvPr/>
-        </p:nvSpPr>
-        <p:spPr>
-          <a:xfrm>
-            <a:off x="2948679" y="1231573"/>
-            <a:ext cx="1142429" cy="1938992"/>
-          </a:xfrm>
-          <a:prstGeom prst="rect">
-            <a:avLst/>
-          </a:prstGeom>
-          <a:noFill/>
-        </p:spPr>
-        <p:txBody>
-          <a:bodyPr wrap="none" rtlCol="0">
-            <a:spAutoFit/>
-          </a:bodyPr>
-          <a:lstStyle/>
-          <a:p>
-            <a:r>
-              <a:rPr lang="en-US" sz="1200" dirty="0">
-                <a:solidFill>
-                  <a:srgbClr val="FF0000"/>
-                </a:solidFill>
-              </a:rPr>
-              <a:t>input.sigs.csv</a:t>
-            </a:r>
-          </a:p>
-          <a:p>
-            <a:r>
-              <a:rPr lang="en-US" sz="1200" dirty="0">
-                <a:solidFill>
-                  <a:srgbClr val="0070C0"/>
-                </a:solidFill>
-              </a:rPr>
-              <a:t>syn.data.csv</a:t>
-            </a:r>
-          </a:p>
-          <a:p>
-            <a:r>
-              <a:rPr lang="en-US" sz="1200" dirty="0" err="1">
-                <a:solidFill>
-                  <a:srgbClr val="C00000"/>
-                </a:solidFill>
-              </a:rPr>
-              <a:t>sa.results</a:t>
-            </a:r>
-            <a:r>
-              <a:rPr lang="en-US" sz="1200" dirty="0">
-                <a:solidFill>
-                  <a:srgbClr val="C00000"/>
-                </a:solidFill>
-              </a:rPr>
-              <a:t>/</a:t>
-            </a:r>
-          </a:p>
-          <a:p>
-            <a:r>
-              <a:rPr lang="en-US" sz="1200" dirty="0">
-                <a:solidFill>
-                  <a:srgbClr val="C00000"/>
-                </a:solidFill>
-              </a:rPr>
-              <a:t>    </a:t>
-            </a:r>
-            <a:r>
-              <a:rPr lang="en-US" sz="1200" dirty="0" err="1">
-                <a:solidFill>
-                  <a:srgbClr val="C00000"/>
-                </a:solidFill>
-              </a:rPr>
-              <a:t>sa.best.run</a:t>
-            </a:r>
-            <a:r>
-              <a:rPr lang="en-US" sz="1200" dirty="0">
-                <a:solidFill>
-                  <a:srgbClr val="C00000"/>
-                </a:solidFill>
-              </a:rPr>
-              <a:t>/</a:t>
-            </a:r>
-          </a:p>
-          <a:p>
-            <a:r>
-              <a:rPr lang="en-US" sz="1200" dirty="0">
-                <a:solidFill>
-                  <a:srgbClr val="C00000"/>
-                </a:solidFill>
-              </a:rPr>
-              <a:t>    </a:t>
-            </a:r>
-            <a:r>
-              <a:rPr lang="en-US" sz="1200" dirty="0" err="1">
-                <a:solidFill>
-                  <a:srgbClr val="C00000"/>
-                </a:solidFill>
-              </a:rPr>
-              <a:t>sa.summary</a:t>
-            </a:r>
-            <a:r>
-              <a:rPr lang="en-US" sz="1200" dirty="0">
-                <a:solidFill>
-                  <a:srgbClr val="C00000"/>
-                </a:solidFill>
-              </a:rPr>
-              <a:t>/</a:t>
-            </a:r>
-          </a:p>
-          <a:p>
-            <a:r>
-              <a:rPr lang="en-US" sz="1200" dirty="0">
-                <a:solidFill>
-                  <a:srgbClr val="C00000"/>
-                </a:solidFill>
-              </a:rPr>
-              <a:t>    </a:t>
-            </a:r>
-            <a:r>
-              <a:rPr lang="en-US" sz="1200" dirty="0" err="1">
-                <a:solidFill>
-                  <a:srgbClr val="C00000"/>
-                </a:solidFill>
-              </a:rPr>
-              <a:t>sa.run.1</a:t>
-            </a:r>
-            <a:r>
-              <a:rPr lang="en-US" sz="1200" dirty="0">
-                <a:solidFill>
-                  <a:srgbClr val="C00000"/>
-                </a:solidFill>
-              </a:rPr>
-              <a:t>/</a:t>
-            </a:r>
-          </a:p>
-          <a:p>
-            <a:r>
-              <a:rPr lang="en-US" sz="1200" dirty="0">
-                <a:solidFill>
-                  <a:srgbClr val="C00000"/>
-                </a:solidFill>
-              </a:rPr>
-              <a:t>    </a:t>
-            </a:r>
-            <a:r>
-              <a:rPr lang="en-US" sz="1200" dirty="0" err="1">
-                <a:solidFill>
-                  <a:srgbClr val="C00000"/>
-                </a:solidFill>
-              </a:rPr>
-              <a:t>sa.run.2</a:t>
-            </a:r>
-            <a:r>
-              <a:rPr lang="en-US" sz="1200" dirty="0">
-                <a:solidFill>
-                  <a:srgbClr val="C00000"/>
-                </a:solidFill>
-              </a:rPr>
-              <a:t>/</a:t>
-            </a:r>
-          </a:p>
-          <a:p>
-            <a:endParaRPr lang="en-US" sz="1200" dirty="0">
-              <a:solidFill>
-                <a:srgbClr val="C00000"/>
-              </a:solidFill>
-            </a:endParaRPr>
-          </a:p>
-          <a:p>
-            <a:r>
-              <a:rPr lang="en-US" sz="1200" dirty="0" err="1">
-                <a:solidFill>
-                  <a:srgbClr val="C00000"/>
-                </a:solidFill>
-              </a:rPr>
-              <a:t>sp.results</a:t>
-            </a:r>
-            <a:r>
-              <a:rPr lang="en-US" sz="1200" dirty="0">
-                <a:solidFill>
-                  <a:srgbClr val="C00000"/>
-                </a:solidFill>
-              </a:rPr>
-              <a:t>/</a:t>
-            </a:r>
-          </a:p>
-          <a:p>
-            <a:r>
-              <a:rPr lang="en-US" sz="1200" dirty="0">
+              <a:rPr lang="en-US" sz="1050" dirty="0">
                 <a:solidFill>
                   <a:srgbClr val="C00000"/>
                 </a:solidFill>
@@ -3868,7 +3511,7 @@
         </p:nvCxnSpPr>
         <p:spPr>
           <a:xfrm>
-            <a:off x="2354342" y="761469"/>
+            <a:off x="2077160" y="761469"/>
             <a:ext cx="18073" cy="213143"/>
           </a:xfrm>
           <a:prstGeom prst="line">
@@ -3900,8 +3543,8 @@
         </p:nvCxnSpPr>
         <p:spPr>
           <a:xfrm>
-            <a:off x="3433022" y="767842"/>
-            <a:ext cx="43031" cy="206771"/>
+            <a:off x="3539716" y="767841"/>
+            <a:ext cx="261316" cy="235447"/>
           </a:xfrm>
           <a:prstGeom prst="line">
             <a:avLst/>
@@ -3932,7 +3575,7 @@
         </p:nvCxnSpPr>
         <p:spPr>
           <a:xfrm>
-            <a:off x="3793046" y="751912"/>
+            <a:off x="4047931" y="764656"/>
             <a:ext cx="759897" cy="222701"/>
           </a:xfrm>
           <a:prstGeom prst="line">
@@ -3964,8 +3607,8 @@
         </p:nvCxnSpPr>
         <p:spPr>
           <a:xfrm>
-            <a:off x="4595571" y="772998"/>
-            <a:ext cx="913529" cy="201614"/>
+            <a:off x="4670768" y="774213"/>
+            <a:ext cx="1184561" cy="229074"/>
           </a:xfrm>
           <a:prstGeom prst="line">
             <a:avLst/>
@@ -3994,8 +3637,8 @@
         </p:nvSpPr>
         <p:spPr>
           <a:xfrm>
-            <a:off x="5226811" y="974612"/>
-            <a:ext cx="564578" cy="276999"/>
+            <a:off x="5567429" y="1003287"/>
+            <a:ext cx="575799" cy="630942"/>
           </a:xfrm>
           <a:prstGeom prst="rect">
             <a:avLst/>
@@ -4020,8 +3663,32 @@
                   <a:srgbClr val="0070C0"/>
                 </a:solidFill>
               </a:rPr>
-              <a:t>sp.sp/</a:t>
-            </a:r>
+              <a:t>sp.sp</a:t>
+            </a:r>
+            <a:r>
+              <a:rPr lang="en-US" sz="1200" dirty="0" smtClean="0">
+                <a:solidFill>
+                  <a:srgbClr val="0070C0"/>
+                </a:solidFill>
+              </a:rPr>
+              <a:t>/</a:t>
+            </a:r>
+          </a:p>
+          <a:p>
+            <a:pPr algn="ctr"/>
+            <a:endParaRPr lang="en-US" sz="1200" dirty="0">
+              <a:solidFill>
+                <a:srgbClr val="0070C0"/>
+              </a:solidFill>
+            </a:endParaRPr>
+          </a:p>
+          <a:p>
+            <a:pPr algn="ctr"/>
+            <a:r>
+              <a:rPr lang="en-US" sz="1050" dirty="0" smtClean="0"/>
+              <a:t>(same)</a:t>
+            </a:r>
+            <a:endParaRPr lang="en-US" sz="1050" dirty="0"/>
           </a:p>
         </p:txBody>
       </p:sp>
@@ -4147,13 +3814,15 @@
       <p:cxnSp>
         <p:nvCxnSpPr>
           <p:cNvPr id="3" name="Curved Connector 2"/>
-          <p:cNvCxnSpPr/>
+          <p:cNvCxnSpPr>
+            <a:stCxn id="6" idx="1"/>
+          </p:cNvCxnSpPr>
           <p:nvPr/>
         </p:nvCxnSpPr>
         <p:spPr>
-          <a:xfrm rot="10800000" flipV="1">
-            <a:off x="3909302" y="672258"/>
-            <a:ext cx="1057770" cy="707307"/>
+          <a:xfrm rot="10800000">
+            <a:off x="3332623" y="1682241"/>
+            <a:ext cx="790143" cy="696416"/>
           </a:xfrm>
           <a:prstGeom prst="curvedConnector3">
             <a:avLst/>
@@ -4188,7 +3857,7 @@
         </p:nvSpPr>
         <p:spPr>
           <a:xfrm>
-            <a:off x="4874676" y="455607"/>
+            <a:off x="4122765" y="2172895"/>
             <a:ext cx="1287170" cy="411523"/>
           </a:xfrm>
           <a:prstGeom prst="rect">

</xml_diff>